<commit_message>
added names to title slides
</commit_message>
<xml_diff>
--- a/Trailer Clips/GameTrailerText.pptx
+++ b/Trailer Clips/GameTrailerText.pptx
@@ -10,9 +10,9 @@
     <p:sldId id="262" r:id="rId4"/>
     <p:sldId id="270" r:id="rId5"/>
     <p:sldId id="265" r:id="rId6"/>
-    <p:sldId id="266" r:id="rId7"/>
-    <p:sldId id="268" r:id="rId8"/>
-    <p:sldId id="269" r:id="rId9"/>
+    <p:sldId id="269" r:id="rId7"/>
+    <p:sldId id="272" r:id="rId8"/>
+    <p:sldId id="273" r:id="rId9"/>
     <p:sldId id="267" r:id="rId10"/>
     <p:sldId id="271" r:id="rId11"/>
   </p:sldIdLst>
@@ -272,7 +272,7 @@
           <a:p>
             <a:fld id="{60EC8E35-898F-4C89-A656-B383537A40AB}" type="datetimeFigureOut">
               <a:rPr lang="en-US" smtClean="0"/>
-              <a:t>12/1/2017</a:t>
+              <a:t>12/3/2017</a:t>
             </a:fld>
             <a:endParaRPr lang="en-US"/>
           </a:p>
@@ -470,7 +470,7 @@
           <a:p>
             <a:fld id="{60EC8E35-898F-4C89-A656-B383537A40AB}" type="datetimeFigureOut">
               <a:rPr lang="en-US" smtClean="0"/>
-              <a:t>12/1/2017</a:t>
+              <a:t>12/3/2017</a:t>
             </a:fld>
             <a:endParaRPr lang="en-US"/>
           </a:p>
@@ -678,7 +678,7 @@
           <a:p>
             <a:fld id="{60EC8E35-898F-4C89-A656-B383537A40AB}" type="datetimeFigureOut">
               <a:rPr lang="en-US" smtClean="0"/>
-              <a:t>12/1/2017</a:t>
+              <a:t>12/3/2017</a:t>
             </a:fld>
             <a:endParaRPr lang="en-US"/>
           </a:p>
@@ -876,7 +876,7 @@
           <a:p>
             <a:fld id="{60EC8E35-898F-4C89-A656-B383537A40AB}" type="datetimeFigureOut">
               <a:rPr lang="en-US" smtClean="0"/>
-              <a:t>12/1/2017</a:t>
+              <a:t>12/3/2017</a:t>
             </a:fld>
             <a:endParaRPr lang="en-US"/>
           </a:p>
@@ -1151,7 +1151,7 @@
           <a:p>
             <a:fld id="{60EC8E35-898F-4C89-A656-B383537A40AB}" type="datetimeFigureOut">
               <a:rPr lang="en-US" smtClean="0"/>
-              <a:t>12/1/2017</a:t>
+              <a:t>12/3/2017</a:t>
             </a:fld>
             <a:endParaRPr lang="en-US"/>
           </a:p>
@@ -1416,7 +1416,7 @@
           <a:p>
             <a:fld id="{60EC8E35-898F-4C89-A656-B383537A40AB}" type="datetimeFigureOut">
               <a:rPr lang="en-US" smtClean="0"/>
-              <a:t>12/1/2017</a:t>
+              <a:t>12/3/2017</a:t>
             </a:fld>
             <a:endParaRPr lang="en-US"/>
           </a:p>
@@ -1828,7 +1828,7 @@
           <a:p>
             <a:fld id="{60EC8E35-898F-4C89-A656-B383537A40AB}" type="datetimeFigureOut">
               <a:rPr lang="en-US" smtClean="0"/>
-              <a:t>12/1/2017</a:t>
+              <a:t>12/3/2017</a:t>
             </a:fld>
             <a:endParaRPr lang="en-US"/>
           </a:p>
@@ -1969,7 +1969,7 @@
           <a:p>
             <a:fld id="{60EC8E35-898F-4C89-A656-B383537A40AB}" type="datetimeFigureOut">
               <a:rPr lang="en-US" smtClean="0"/>
-              <a:t>12/1/2017</a:t>
+              <a:t>12/3/2017</a:t>
             </a:fld>
             <a:endParaRPr lang="en-US"/>
           </a:p>
@@ -2082,7 +2082,7 @@
           <a:p>
             <a:fld id="{60EC8E35-898F-4C89-A656-B383537A40AB}" type="datetimeFigureOut">
               <a:rPr lang="en-US" smtClean="0"/>
-              <a:t>12/1/2017</a:t>
+              <a:t>12/3/2017</a:t>
             </a:fld>
             <a:endParaRPr lang="en-US"/>
           </a:p>
@@ -2393,7 +2393,7 @@
           <a:p>
             <a:fld id="{60EC8E35-898F-4C89-A656-B383537A40AB}" type="datetimeFigureOut">
               <a:rPr lang="en-US" smtClean="0"/>
-              <a:t>12/1/2017</a:t>
+              <a:t>12/3/2017</a:t>
             </a:fld>
             <a:endParaRPr lang="en-US"/>
           </a:p>
@@ -2681,7 +2681,7 @@
           <a:p>
             <a:fld id="{60EC8E35-898F-4C89-A656-B383537A40AB}" type="datetimeFigureOut">
               <a:rPr lang="en-US" smtClean="0"/>
-              <a:t>12/1/2017</a:t>
+              <a:t>12/3/2017</a:t>
             </a:fld>
             <a:endParaRPr lang="en-US"/>
           </a:p>
@@ -2922,7 +2922,7 @@
           <a:p>
             <a:fld id="{60EC8E35-898F-4C89-A656-B383537A40AB}" type="datetimeFigureOut">
               <a:rPr lang="en-US" smtClean="0"/>
-              <a:t>12/1/2017</a:t>
+              <a:t>12/3/2017</a:t>
             </a:fld>
             <a:endParaRPr lang="en-US"/>
           </a:p>
@@ -4290,7 +4290,7 @@
         </p:blipFill>
         <p:spPr bwMode="auto">
           <a:xfrm>
-            <a:off x="3549771" y="3292475"/>
+            <a:off x="3549771" y="3033859"/>
             <a:ext cx="4762500" cy="2857500"/>
           </a:xfrm>
           <a:prstGeom prst="rect">
@@ -4308,10 +4308,149 @@
           </a:extLst>
         </p:spPr>
       </p:pic>
+      <p:sp>
+        <p:nvSpPr>
+          <p:cNvPr id="6" name="TextBox 5">
+            <a:extLst>
+              <a:ext uri="{FF2B5EF4-FFF2-40B4-BE49-F238E27FC236}">
+                <a16:creationId xmlns:a16="http://schemas.microsoft.com/office/drawing/2014/main" id="{13893B38-B109-48C0-B82D-9477AD6C5E5C}"/>
+              </a:ext>
+            </a:extLst>
+          </p:cNvPr>
+          <p:cNvSpPr txBox="1"/>
+          <p:nvPr/>
+        </p:nvSpPr>
+        <p:spPr>
+          <a:xfrm>
+            <a:off x="836769" y="5950044"/>
+            <a:ext cx="10518462" cy="707886"/>
+          </a:xfrm>
+          <a:prstGeom prst="rect">
+            <a:avLst/>
+          </a:prstGeom>
+          <a:noFill/>
+        </p:spPr>
+        <p:txBody>
+          <a:bodyPr wrap="square" rtlCol="0">
+            <a:spAutoFit/>
+          </a:bodyPr>
+          <a:lstStyle/>
+          <a:p>
+            <a:r>
+              <a:rPr lang="en-US" sz="4000" dirty="0">
+                <a:solidFill>
+                  <a:schemeClr val="bg1">
+                    <a:lumMod val="95000"/>
+                  </a:schemeClr>
+                </a:solidFill>
+              </a:rPr>
+              <a:t>Masahiro Ward       Vaidehi Narayan       Pauline Do </a:t>
+            </a:r>
+          </a:p>
+        </p:txBody>
+      </p:sp>
+      <p:sp>
+        <p:nvSpPr>
+          <p:cNvPr id="2" name="Oval 1">
+            <a:extLst>
+              <a:ext uri="{FF2B5EF4-FFF2-40B4-BE49-F238E27FC236}">
+                <a16:creationId xmlns:a16="http://schemas.microsoft.com/office/drawing/2014/main" id="{7E3E7BC7-50DF-4940-9442-D4F24BE3795F}"/>
+              </a:ext>
+            </a:extLst>
+          </p:cNvPr>
+          <p:cNvSpPr/>
+          <p:nvPr/>
+        </p:nvSpPr>
+        <p:spPr>
+          <a:xfrm>
+            <a:off x="4452367" y="6262422"/>
+            <a:ext cx="157018" cy="157018"/>
+          </a:xfrm>
+          <a:prstGeom prst="ellipse">
+            <a:avLst/>
+          </a:prstGeom>
+          <a:solidFill>
+            <a:schemeClr val="bg1"/>
+          </a:solidFill>
+        </p:spPr>
+        <p:style>
+          <a:lnRef idx="2">
+            <a:schemeClr val="dk1">
+              <a:shade val="50000"/>
+            </a:schemeClr>
+          </a:lnRef>
+          <a:fillRef idx="1">
+            <a:schemeClr val="dk1"/>
+          </a:fillRef>
+          <a:effectRef idx="0">
+            <a:schemeClr val="dk1"/>
+          </a:effectRef>
+          <a:fontRef idx="minor">
+            <a:schemeClr val="lt1"/>
+          </a:fontRef>
+        </p:style>
+        <p:txBody>
+          <a:bodyPr rtlCol="0" anchor="ctr"/>
+          <a:lstStyle/>
+          <a:p>
+            <a:pPr algn="ctr"/>
+            <a:endParaRPr lang="en-US"/>
+          </a:p>
+        </p:txBody>
+      </p:sp>
+      <p:sp>
+        <p:nvSpPr>
+          <p:cNvPr id="8" name="Oval 7">
+            <a:extLst>
+              <a:ext uri="{FF2B5EF4-FFF2-40B4-BE49-F238E27FC236}">
+                <a16:creationId xmlns:a16="http://schemas.microsoft.com/office/drawing/2014/main" id="{75A8816E-2EF2-45B6-AF2D-799212270E47}"/>
+              </a:ext>
+            </a:extLst>
+          </p:cNvPr>
+          <p:cNvSpPr/>
+          <p:nvPr/>
+        </p:nvSpPr>
+        <p:spPr>
+          <a:xfrm>
+            <a:off x="8539020" y="6262422"/>
+            <a:ext cx="157018" cy="157018"/>
+          </a:xfrm>
+          <a:prstGeom prst="ellipse">
+            <a:avLst/>
+          </a:prstGeom>
+          <a:solidFill>
+            <a:schemeClr val="bg1"/>
+          </a:solidFill>
+        </p:spPr>
+        <p:style>
+          <a:lnRef idx="2">
+            <a:schemeClr val="dk1">
+              <a:shade val="50000"/>
+            </a:schemeClr>
+          </a:lnRef>
+          <a:fillRef idx="1">
+            <a:schemeClr val="dk1"/>
+          </a:fillRef>
+          <a:effectRef idx="0">
+            <a:schemeClr val="dk1"/>
+          </a:effectRef>
+          <a:fontRef idx="minor">
+            <a:schemeClr val="lt1"/>
+          </a:fontRef>
+        </p:style>
+        <p:txBody>
+          <a:bodyPr rtlCol="0" anchor="ctr"/>
+          <a:lstStyle/>
+          <a:p>
+            <a:pPr algn="ctr"/>
+            <a:endParaRPr lang="en-US"/>
+          </a:p>
+        </p:txBody>
+      </p:sp>
     </p:spTree>
     <p:extLst>
       <p:ext uri="{BB962C8B-B14F-4D97-AF65-F5344CB8AC3E}">
-        <p14:creationId xmlns:p14="http://schemas.microsoft.com/office/powerpoint/2010/main" val="31713472"/>
+        <p14:creationId xmlns:p14="http://schemas.microsoft.com/office/powerpoint/2010/main" val="3524035305"/>
       </p:ext>
     </p:extLst>
   </p:cSld>
@@ -4417,7 +4556,7 @@
         </p:blipFill>
         <p:spPr bwMode="auto">
           <a:xfrm>
-            <a:off x="3549771" y="3292475"/>
+            <a:off x="3549771" y="3033859"/>
             <a:ext cx="4762500" cy="2857500"/>
           </a:xfrm>
           <a:prstGeom prst="rect">
@@ -4464,7 +4603,7 @@
         </p:blipFill>
         <p:spPr bwMode="auto">
           <a:xfrm>
-            <a:off x="3474654" y="3429000"/>
+            <a:off x="3482871" y="3173264"/>
             <a:ext cx="4762500" cy="2857500"/>
           </a:xfrm>
           <a:prstGeom prst="rect">
@@ -4482,10 +4621,149 @@
           </a:extLst>
         </p:spPr>
       </p:pic>
+      <p:sp>
+        <p:nvSpPr>
+          <p:cNvPr id="6" name="TextBox 5">
+            <a:extLst>
+              <a:ext uri="{FF2B5EF4-FFF2-40B4-BE49-F238E27FC236}">
+                <a16:creationId xmlns:a16="http://schemas.microsoft.com/office/drawing/2014/main" id="{13893B38-B109-48C0-B82D-9477AD6C5E5C}"/>
+              </a:ext>
+            </a:extLst>
+          </p:cNvPr>
+          <p:cNvSpPr txBox="1"/>
+          <p:nvPr/>
+        </p:nvSpPr>
+        <p:spPr>
+          <a:xfrm>
+            <a:off x="836769" y="5950044"/>
+            <a:ext cx="10518462" cy="707886"/>
+          </a:xfrm>
+          <a:prstGeom prst="rect">
+            <a:avLst/>
+          </a:prstGeom>
+          <a:noFill/>
+        </p:spPr>
+        <p:txBody>
+          <a:bodyPr wrap="square" rtlCol="0">
+            <a:spAutoFit/>
+          </a:bodyPr>
+          <a:lstStyle/>
+          <a:p>
+            <a:r>
+              <a:rPr lang="en-US" sz="4000" dirty="0">
+                <a:solidFill>
+                  <a:schemeClr val="bg1">
+                    <a:lumMod val="95000"/>
+                  </a:schemeClr>
+                </a:solidFill>
+              </a:rPr>
+              <a:t>Masahiro Ward       Vaidehi Narayan       Pauline Do </a:t>
+            </a:r>
+          </a:p>
+        </p:txBody>
+      </p:sp>
+      <p:sp>
+        <p:nvSpPr>
+          <p:cNvPr id="2" name="Oval 1">
+            <a:extLst>
+              <a:ext uri="{FF2B5EF4-FFF2-40B4-BE49-F238E27FC236}">
+                <a16:creationId xmlns:a16="http://schemas.microsoft.com/office/drawing/2014/main" id="{7E3E7BC7-50DF-4940-9442-D4F24BE3795F}"/>
+              </a:ext>
+            </a:extLst>
+          </p:cNvPr>
+          <p:cNvSpPr/>
+          <p:nvPr/>
+        </p:nvSpPr>
+        <p:spPr>
+          <a:xfrm>
+            <a:off x="4452367" y="6262422"/>
+            <a:ext cx="157018" cy="157018"/>
+          </a:xfrm>
+          <a:prstGeom prst="ellipse">
+            <a:avLst/>
+          </a:prstGeom>
+          <a:solidFill>
+            <a:schemeClr val="bg1"/>
+          </a:solidFill>
+        </p:spPr>
+        <p:style>
+          <a:lnRef idx="2">
+            <a:schemeClr val="dk1">
+              <a:shade val="50000"/>
+            </a:schemeClr>
+          </a:lnRef>
+          <a:fillRef idx="1">
+            <a:schemeClr val="dk1"/>
+          </a:fillRef>
+          <a:effectRef idx="0">
+            <a:schemeClr val="dk1"/>
+          </a:effectRef>
+          <a:fontRef idx="minor">
+            <a:schemeClr val="lt1"/>
+          </a:fontRef>
+        </p:style>
+        <p:txBody>
+          <a:bodyPr rtlCol="0" anchor="ctr"/>
+          <a:lstStyle/>
+          <a:p>
+            <a:pPr algn="ctr"/>
+            <a:endParaRPr lang="en-US"/>
+          </a:p>
+        </p:txBody>
+      </p:sp>
+      <p:sp>
+        <p:nvSpPr>
+          <p:cNvPr id="8" name="Oval 7">
+            <a:extLst>
+              <a:ext uri="{FF2B5EF4-FFF2-40B4-BE49-F238E27FC236}">
+                <a16:creationId xmlns:a16="http://schemas.microsoft.com/office/drawing/2014/main" id="{75A8816E-2EF2-45B6-AF2D-799212270E47}"/>
+              </a:ext>
+            </a:extLst>
+          </p:cNvPr>
+          <p:cNvSpPr/>
+          <p:nvPr/>
+        </p:nvSpPr>
+        <p:spPr>
+          <a:xfrm>
+            <a:off x="8539020" y="6262422"/>
+            <a:ext cx="157018" cy="157018"/>
+          </a:xfrm>
+          <a:prstGeom prst="ellipse">
+            <a:avLst/>
+          </a:prstGeom>
+          <a:solidFill>
+            <a:schemeClr val="bg1"/>
+          </a:solidFill>
+        </p:spPr>
+        <p:style>
+          <a:lnRef idx="2">
+            <a:schemeClr val="dk1">
+              <a:shade val="50000"/>
+            </a:schemeClr>
+          </a:lnRef>
+          <a:fillRef idx="1">
+            <a:schemeClr val="dk1"/>
+          </a:fillRef>
+          <a:effectRef idx="0">
+            <a:schemeClr val="dk1"/>
+          </a:effectRef>
+          <a:fontRef idx="minor">
+            <a:schemeClr val="lt1"/>
+          </a:fontRef>
+        </p:style>
+        <p:txBody>
+          <a:bodyPr rtlCol="0" anchor="ctr"/>
+          <a:lstStyle/>
+          <a:p>
+            <a:pPr algn="ctr"/>
+            <a:endParaRPr lang="en-US"/>
+          </a:p>
+        </p:txBody>
+      </p:sp>
     </p:spTree>
     <p:extLst>
       <p:ext uri="{BB962C8B-B14F-4D97-AF65-F5344CB8AC3E}">
-        <p14:creationId xmlns:p14="http://schemas.microsoft.com/office/powerpoint/2010/main" val="3594901926"/>
+        <p14:creationId xmlns:p14="http://schemas.microsoft.com/office/powerpoint/2010/main" val="2527177788"/>
       </p:ext>
     </p:extLst>
   </p:cSld>
@@ -4591,7 +4869,7 @@
         </p:blipFill>
         <p:spPr bwMode="auto">
           <a:xfrm>
-            <a:off x="3549771" y="3292475"/>
+            <a:off x="3549771" y="3033859"/>
             <a:ext cx="4762500" cy="2857500"/>
           </a:xfrm>
           <a:prstGeom prst="rect">
@@ -4638,7 +4916,7 @@
         </p:blipFill>
         <p:spPr bwMode="auto">
           <a:xfrm>
-            <a:off x="3474654" y="3429000"/>
+            <a:off x="3482871" y="3173264"/>
             <a:ext cx="4762500" cy="2857500"/>
           </a:xfrm>
           <a:prstGeom prst="rect">
@@ -4685,7 +4963,7 @@
         </p:blipFill>
         <p:spPr bwMode="auto">
           <a:xfrm>
-            <a:off x="3399536" y="3429000"/>
+            <a:off x="3399538" y="3178089"/>
             <a:ext cx="4837617" cy="2902570"/>
           </a:xfrm>
           <a:prstGeom prst="rect">
@@ -4703,10 +4981,149 @@
           </a:extLst>
         </p:spPr>
       </p:pic>
+      <p:sp>
+        <p:nvSpPr>
+          <p:cNvPr id="6" name="TextBox 5">
+            <a:extLst>
+              <a:ext uri="{FF2B5EF4-FFF2-40B4-BE49-F238E27FC236}">
+                <a16:creationId xmlns:a16="http://schemas.microsoft.com/office/drawing/2014/main" id="{13893B38-B109-48C0-B82D-9477AD6C5E5C}"/>
+              </a:ext>
+            </a:extLst>
+          </p:cNvPr>
+          <p:cNvSpPr txBox="1"/>
+          <p:nvPr/>
+        </p:nvSpPr>
+        <p:spPr>
+          <a:xfrm>
+            <a:off x="836769" y="5950044"/>
+            <a:ext cx="10518462" cy="707886"/>
+          </a:xfrm>
+          <a:prstGeom prst="rect">
+            <a:avLst/>
+          </a:prstGeom>
+          <a:noFill/>
+        </p:spPr>
+        <p:txBody>
+          <a:bodyPr wrap="square" rtlCol="0">
+            <a:spAutoFit/>
+          </a:bodyPr>
+          <a:lstStyle/>
+          <a:p>
+            <a:r>
+              <a:rPr lang="en-US" sz="4000" dirty="0">
+                <a:solidFill>
+                  <a:schemeClr val="bg1">
+                    <a:lumMod val="95000"/>
+                  </a:schemeClr>
+                </a:solidFill>
+              </a:rPr>
+              <a:t>Masahiro Ward       Vaidehi Narayan       Pauline Do </a:t>
+            </a:r>
+          </a:p>
+        </p:txBody>
+      </p:sp>
+      <p:sp>
+        <p:nvSpPr>
+          <p:cNvPr id="2" name="Oval 1">
+            <a:extLst>
+              <a:ext uri="{FF2B5EF4-FFF2-40B4-BE49-F238E27FC236}">
+                <a16:creationId xmlns:a16="http://schemas.microsoft.com/office/drawing/2014/main" id="{7E3E7BC7-50DF-4940-9442-D4F24BE3795F}"/>
+              </a:ext>
+            </a:extLst>
+          </p:cNvPr>
+          <p:cNvSpPr/>
+          <p:nvPr/>
+        </p:nvSpPr>
+        <p:spPr>
+          <a:xfrm>
+            <a:off x="4452367" y="6262422"/>
+            <a:ext cx="157018" cy="157018"/>
+          </a:xfrm>
+          <a:prstGeom prst="ellipse">
+            <a:avLst/>
+          </a:prstGeom>
+          <a:solidFill>
+            <a:schemeClr val="bg1"/>
+          </a:solidFill>
+        </p:spPr>
+        <p:style>
+          <a:lnRef idx="2">
+            <a:schemeClr val="dk1">
+              <a:shade val="50000"/>
+            </a:schemeClr>
+          </a:lnRef>
+          <a:fillRef idx="1">
+            <a:schemeClr val="dk1"/>
+          </a:fillRef>
+          <a:effectRef idx="0">
+            <a:schemeClr val="dk1"/>
+          </a:effectRef>
+          <a:fontRef idx="minor">
+            <a:schemeClr val="lt1"/>
+          </a:fontRef>
+        </p:style>
+        <p:txBody>
+          <a:bodyPr rtlCol="0" anchor="ctr"/>
+          <a:lstStyle/>
+          <a:p>
+            <a:pPr algn="ctr"/>
+            <a:endParaRPr lang="en-US"/>
+          </a:p>
+        </p:txBody>
+      </p:sp>
+      <p:sp>
+        <p:nvSpPr>
+          <p:cNvPr id="8" name="Oval 7">
+            <a:extLst>
+              <a:ext uri="{FF2B5EF4-FFF2-40B4-BE49-F238E27FC236}">
+                <a16:creationId xmlns:a16="http://schemas.microsoft.com/office/drawing/2014/main" id="{75A8816E-2EF2-45B6-AF2D-799212270E47}"/>
+              </a:ext>
+            </a:extLst>
+          </p:cNvPr>
+          <p:cNvSpPr/>
+          <p:nvPr/>
+        </p:nvSpPr>
+        <p:spPr>
+          <a:xfrm>
+            <a:off x="8539020" y="6262422"/>
+            <a:ext cx="157018" cy="157018"/>
+          </a:xfrm>
+          <a:prstGeom prst="ellipse">
+            <a:avLst/>
+          </a:prstGeom>
+          <a:solidFill>
+            <a:schemeClr val="bg1"/>
+          </a:solidFill>
+        </p:spPr>
+        <p:style>
+          <a:lnRef idx="2">
+            <a:schemeClr val="dk1">
+              <a:shade val="50000"/>
+            </a:schemeClr>
+          </a:lnRef>
+          <a:fillRef idx="1">
+            <a:schemeClr val="dk1"/>
+          </a:fillRef>
+          <a:effectRef idx="0">
+            <a:schemeClr val="dk1"/>
+          </a:effectRef>
+          <a:fontRef idx="minor">
+            <a:schemeClr val="lt1"/>
+          </a:fontRef>
+        </p:style>
+        <p:txBody>
+          <a:bodyPr rtlCol="0" anchor="ctr"/>
+          <a:lstStyle/>
+          <a:p>
+            <a:pPr algn="ctr"/>
+            <a:endParaRPr lang="en-US"/>
+          </a:p>
+        </p:txBody>
+      </p:sp>
     </p:spTree>
     <p:extLst>
       <p:ext uri="{BB962C8B-B14F-4D97-AF65-F5344CB8AC3E}">
-        <p14:creationId xmlns:p14="http://schemas.microsoft.com/office/powerpoint/2010/main" val="3524035305"/>
+        <p14:creationId xmlns:p14="http://schemas.microsoft.com/office/powerpoint/2010/main" val="501829248"/>
       </p:ext>
     </p:extLst>
   </p:cSld>

</xml_diff>